<commit_message>
minor changes to bookmarks in Welcome presentation
</commit_message>
<xml_diff>
--- a/PowerPoint Creations/WelcomeToActiveNet.pptx
+++ b/PowerPoint Creations/WelcomeToActiveNet.pptx
@@ -3199,6 +3199,13 @@
     <dgm:pt modelId="{4C862E51-229B-B143-8B2D-1791FDEB29A4}" type="pres">
       <dgm:prSet presAssocID="{E4D52DD6-8E93-DA47-861B-070DF189DD2E}" presName="parentLeftMargin" presStyleLbl="node1" presStyleIdx="0" presStyleCnt="3"/>
       <dgm:spPr/>
+      <dgm:t>
+        <a:bodyPr/>
+        <a:lstStyle/>
+        <a:p>
+          <a:endParaRPr lang="en-US"/>
+        </a:p>
+      </dgm:t>
     </dgm:pt>
     <dgm:pt modelId="{BDF6B77D-5100-414E-ACAD-FCD248D7259D}" type="pres">
       <dgm:prSet presAssocID="{E4D52DD6-8E93-DA47-861B-070DF189DD2E}" presName="parentText" presStyleLbl="node1" presStyleIdx="0" presStyleCnt="3">
@@ -3246,6 +3253,13 @@
     <dgm:pt modelId="{81A8EB38-B1A4-AE41-A2A7-8E54CD54F91A}" type="pres">
       <dgm:prSet presAssocID="{62F9CE2C-EF1C-7141-AD91-BB931B7B6E01}" presName="parentLeftMargin" presStyleLbl="node1" presStyleIdx="0" presStyleCnt="3"/>
       <dgm:spPr/>
+      <dgm:t>
+        <a:bodyPr/>
+        <a:lstStyle/>
+        <a:p>
+          <a:endParaRPr lang="en-US"/>
+        </a:p>
+      </dgm:t>
     </dgm:pt>
     <dgm:pt modelId="{4A477F58-65EC-3743-8699-89515F4BA652}" type="pres">
       <dgm:prSet presAssocID="{62F9CE2C-EF1C-7141-AD91-BB931B7B6E01}" presName="parentText" presStyleLbl="node1" presStyleIdx="1" presStyleCnt="3">
@@ -3255,6 +3269,13 @@
         </dgm:presLayoutVars>
       </dgm:prSet>
       <dgm:spPr/>
+      <dgm:t>
+        <a:bodyPr/>
+        <a:lstStyle/>
+        <a:p>
+          <a:endParaRPr lang="en-US"/>
+        </a:p>
+      </dgm:t>
     </dgm:pt>
     <dgm:pt modelId="{1346BC18-6DF1-FA4D-AB62-BE30E22F5C50}" type="pres">
       <dgm:prSet presAssocID="{62F9CE2C-EF1C-7141-AD91-BB931B7B6E01}" presName="negativeSpace" presStyleCnt="0"/>
@@ -3286,6 +3307,13 @@
     <dgm:pt modelId="{33FB73DB-8E34-AE4E-911F-7588EE773C6B}" type="pres">
       <dgm:prSet presAssocID="{08A195A3-C402-E340-8746-2070BAAA8FCA}" presName="parentLeftMargin" presStyleLbl="node1" presStyleIdx="1" presStyleCnt="3"/>
       <dgm:spPr/>
+      <dgm:t>
+        <a:bodyPr/>
+        <a:lstStyle/>
+        <a:p>
+          <a:endParaRPr lang="en-US"/>
+        </a:p>
+      </dgm:t>
     </dgm:pt>
     <dgm:pt modelId="{31082E84-BB13-8C4E-835E-9E892BA54D3B}" type="pres">
       <dgm:prSet presAssocID="{08A195A3-C402-E340-8746-2070BAAA8FCA}" presName="parentText" presStyleLbl="node1" presStyleIdx="2" presStyleCnt="3">
@@ -3295,6 +3323,13 @@
         </dgm:presLayoutVars>
       </dgm:prSet>
       <dgm:spPr/>
+      <dgm:t>
+        <a:bodyPr/>
+        <a:lstStyle/>
+        <a:p>
+          <a:endParaRPr lang="en-US"/>
+        </a:p>
+      </dgm:t>
     </dgm:pt>
     <dgm:pt modelId="{4AC15961-6FF9-4A48-8B29-8D4A619293BA}" type="pres">
       <dgm:prSet presAssocID="{08A195A3-C402-E340-8746-2070BAAA8FCA}" presName="negativeSpace" presStyleCnt="0"/>
@@ -3317,26 +3352,26 @@
     </dgm:pt>
   </dgm:ptLst>
   <dgm:cxnLst>
+    <dgm:cxn modelId="{62B3C3C9-CDF6-D64E-8E02-D6AA74C7A9A2}" srcId="{E4D52DD6-8E93-DA47-861B-070DF189DD2E}" destId="{68C8B304-FD04-7743-95AA-2D33F1F38D20}" srcOrd="0" destOrd="0" parTransId="{AD38301F-0361-4D4D-A23D-859ED143C734}" sibTransId="{C44E5EFD-7B5E-C248-A76B-3AD7B829314A}"/>
+    <dgm:cxn modelId="{7F41640B-E619-B446-AD1E-27684B7A3AE9}" srcId="{E4949E61-7429-4064-85AF-11B13624FC5C}" destId="{62F9CE2C-EF1C-7141-AD91-BB931B7B6E01}" srcOrd="1" destOrd="0" parTransId="{CB6558EC-E5AC-4A45-B6E5-BDD28147E88B}" sibTransId="{2AF37B29-350B-944F-8B54-4AD2471E9CCA}"/>
     <dgm:cxn modelId="{920902EB-6269-4A44-9B92-4D4B666FD885}" srcId="{08A195A3-C402-E340-8746-2070BAAA8FCA}" destId="{C3BBC56F-4549-1849-A39E-12CB9B308CEF}" srcOrd="2" destOrd="0" parTransId="{D050A164-CB83-AC42-AC4D-4300698FB9BF}" sibTransId="{015EB091-5FF7-0F4B-9FE6-5D9102633097}"/>
+    <dgm:cxn modelId="{7E4D33A0-1B6A-914F-AAA3-3207FA894021}" type="presOf" srcId="{603CF1F2-27E0-2645-BC24-DC36A765FE74}" destId="{0A2618DB-9165-994E-B792-A0F450012729}" srcOrd="0" destOrd="1" presId="urn:microsoft.com/office/officeart/2005/8/layout/list1"/>
+    <dgm:cxn modelId="{31054224-46D2-8845-A8EB-729B0A52FF8F}" srcId="{08A195A3-C402-E340-8746-2070BAAA8FCA}" destId="{603CF1F2-27E0-2645-BC24-DC36A765FE74}" srcOrd="1" destOrd="0" parTransId="{9E864A3D-1A78-1447-9A4A-C7BADDC6719E}" sibTransId="{8DA2A30A-1D2F-7342-B9F8-0DCFA5ADE908}"/>
+    <dgm:cxn modelId="{9126CE88-6FFA-D944-B0BC-9143EFAAB926}" type="presOf" srcId="{08A195A3-C402-E340-8746-2070BAAA8FCA}" destId="{31082E84-BB13-8C4E-835E-9E892BA54D3B}" srcOrd="1" destOrd="0" presId="urn:microsoft.com/office/officeart/2005/8/layout/list1"/>
+    <dgm:cxn modelId="{C62A1AE5-6DE1-0E4E-A4DA-E9DB1E0C16DF}" type="presOf" srcId="{C3BBC56F-4549-1849-A39E-12CB9B308CEF}" destId="{0A2618DB-9165-994E-B792-A0F450012729}" srcOrd="0" destOrd="2" presId="urn:microsoft.com/office/officeart/2005/8/layout/list1"/>
+    <dgm:cxn modelId="{6D81DAC6-4577-4E44-9214-AC12436D56F0}" type="presOf" srcId="{E4D52DD6-8E93-DA47-861B-070DF189DD2E}" destId="{BDF6B77D-5100-414E-ACAD-FCD248D7259D}" srcOrd="1" destOrd="0" presId="urn:microsoft.com/office/officeart/2005/8/layout/list1"/>
+    <dgm:cxn modelId="{271F991E-9BA1-6848-B4B7-0181E8F72608}" type="presOf" srcId="{62F9CE2C-EF1C-7141-AD91-BB931B7B6E01}" destId="{81A8EB38-B1A4-AE41-A2A7-8E54CD54F91A}" srcOrd="0" destOrd="0" presId="urn:microsoft.com/office/officeart/2005/8/layout/list1"/>
+    <dgm:cxn modelId="{63F16583-5F92-1C4D-A393-FAC1AA175230}" srcId="{62F9CE2C-EF1C-7141-AD91-BB931B7B6E01}" destId="{58D04AD0-AC8C-8D43-9B7E-BB09843B6436}" srcOrd="0" destOrd="0" parTransId="{898243F4-311E-EB46-9EEB-688FEDA9914A}" sibTransId="{9568C0C1-0C58-5A4B-9BD3-5A30FEFF2531}"/>
     <dgm:cxn modelId="{DEBD6BAE-9C4B-B041-A4BD-C4332D2D094D}" type="presOf" srcId="{68C8B304-FD04-7743-95AA-2D33F1F38D20}" destId="{93587A36-1B6A-DB40-81F1-3D0B0F55281E}" srcOrd="0" destOrd="0" presId="urn:microsoft.com/office/officeart/2005/8/layout/list1"/>
+    <dgm:cxn modelId="{647AB024-A6A5-8B4E-9B5C-4BE99799BDDF}" srcId="{E4949E61-7429-4064-85AF-11B13624FC5C}" destId="{08A195A3-C402-E340-8746-2070BAAA8FCA}" srcOrd="2" destOrd="0" parTransId="{F51807F4-5E0F-8843-97DD-8512F2FA4C38}" sibTransId="{7CC74D48-AF43-A14C-AD48-B116F0BC3AD9}"/>
+    <dgm:cxn modelId="{7C3A040E-1291-7F4A-923B-FE83CB7669E8}" type="presOf" srcId="{58D04AD0-AC8C-8D43-9B7E-BB09843B6436}" destId="{9CFD8A0A-DDB4-A34C-B3B9-61BD0A40CDE7}" srcOrd="0" destOrd="0" presId="urn:microsoft.com/office/officeart/2005/8/layout/list1"/>
     <dgm:cxn modelId="{6BCCE835-8032-5541-A954-1773F8F45927}" srcId="{E4949E61-7429-4064-85AF-11B13624FC5C}" destId="{E4D52DD6-8E93-DA47-861B-070DF189DD2E}" srcOrd="0" destOrd="0" parTransId="{2803DA79-D4EC-7E48-A51F-0A261B786823}" sibTransId="{B9431088-539D-C945-8036-2F3E81BFA869}"/>
-    <dgm:cxn modelId="{7C3A040E-1291-7F4A-923B-FE83CB7669E8}" type="presOf" srcId="{58D04AD0-AC8C-8D43-9B7E-BB09843B6436}" destId="{9CFD8A0A-DDB4-A34C-B3B9-61BD0A40CDE7}" srcOrd="0" destOrd="0" presId="urn:microsoft.com/office/officeart/2005/8/layout/list1"/>
-    <dgm:cxn modelId="{7E4D33A0-1B6A-914F-AAA3-3207FA894021}" type="presOf" srcId="{603CF1F2-27E0-2645-BC24-DC36A765FE74}" destId="{0A2618DB-9165-994E-B792-A0F450012729}" srcOrd="0" destOrd="1" presId="urn:microsoft.com/office/officeart/2005/8/layout/list1"/>
-    <dgm:cxn modelId="{9126CE88-6FFA-D944-B0BC-9143EFAAB926}" type="presOf" srcId="{08A195A3-C402-E340-8746-2070BAAA8FCA}" destId="{31082E84-BB13-8C4E-835E-9E892BA54D3B}" srcOrd="1" destOrd="0" presId="urn:microsoft.com/office/officeart/2005/8/layout/list1"/>
-    <dgm:cxn modelId="{647AB024-A6A5-8B4E-9B5C-4BE99799BDDF}" srcId="{E4949E61-7429-4064-85AF-11B13624FC5C}" destId="{08A195A3-C402-E340-8746-2070BAAA8FCA}" srcOrd="2" destOrd="0" parTransId="{F51807F4-5E0F-8843-97DD-8512F2FA4C38}" sibTransId="{7CC74D48-AF43-A14C-AD48-B116F0BC3AD9}"/>
     <dgm:cxn modelId="{91A6F263-0C70-224C-892C-73C9684189D5}" type="presOf" srcId="{08A195A3-C402-E340-8746-2070BAAA8FCA}" destId="{33FB73DB-8E34-AE4E-911F-7588EE773C6B}" srcOrd="0" destOrd="0" presId="urn:microsoft.com/office/officeart/2005/8/layout/list1"/>
+    <dgm:cxn modelId="{61F98DD5-AC2A-9E42-8B42-A6DDC2F67303}" type="presOf" srcId="{62F9CE2C-EF1C-7141-AD91-BB931B7B6E01}" destId="{4A477F58-65EC-3743-8699-89515F4BA652}" srcOrd="1" destOrd="0" presId="urn:microsoft.com/office/officeart/2005/8/layout/list1"/>
+    <dgm:cxn modelId="{DF7D4194-A0A2-4E4E-8F92-85122B73D735}" type="presOf" srcId="{E4949E61-7429-4064-85AF-11B13624FC5C}" destId="{4703772F-8068-4BD3-AAB9-763FB9F544EB}" srcOrd="0" destOrd="0" presId="urn:microsoft.com/office/officeart/2005/8/layout/list1"/>
     <dgm:cxn modelId="{74DDF96A-42AD-FC43-B90A-A3BDA886EC40}" type="presOf" srcId="{895D886A-E010-0C4F-B01E-0FBE80641CB9}" destId="{0A2618DB-9165-994E-B792-A0F450012729}" srcOrd="0" destOrd="0" presId="urn:microsoft.com/office/officeart/2005/8/layout/list1"/>
+    <dgm:cxn modelId="{B324EED3-8808-5142-95BC-8471F1859606}" type="presOf" srcId="{E4D52DD6-8E93-DA47-861B-070DF189DD2E}" destId="{4C862E51-229B-B143-8B2D-1791FDEB29A4}" srcOrd="0" destOrd="0" presId="urn:microsoft.com/office/officeart/2005/8/layout/list1"/>
     <dgm:cxn modelId="{4BC9ACE0-7B17-F447-ADE3-AD56C2F9A512}" srcId="{08A195A3-C402-E340-8746-2070BAAA8FCA}" destId="{895D886A-E010-0C4F-B01E-0FBE80641CB9}" srcOrd="0" destOrd="0" parTransId="{B2285800-53A6-5949-9983-BB0FF865EF62}" sibTransId="{D5F4685C-813F-5C45-A7C5-8C9E0A668098}"/>
-    <dgm:cxn modelId="{62B3C3C9-CDF6-D64E-8E02-D6AA74C7A9A2}" srcId="{E4D52DD6-8E93-DA47-861B-070DF189DD2E}" destId="{68C8B304-FD04-7743-95AA-2D33F1F38D20}" srcOrd="0" destOrd="0" parTransId="{AD38301F-0361-4D4D-A23D-859ED143C734}" sibTransId="{C44E5EFD-7B5E-C248-A76B-3AD7B829314A}"/>
-    <dgm:cxn modelId="{B324EED3-8808-5142-95BC-8471F1859606}" type="presOf" srcId="{E4D52DD6-8E93-DA47-861B-070DF189DD2E}" destId="{4C862E51-229B-B143-8B2D-1791FDEB29A4}" srcOrd="0" destOrd="0" presId="urn:microsoft.com/office/officeart/2005/8/layout/list1"/>
-    <dgm:cxn modelId="{61F98DD5-AC2A-9E42-8B42-A6DDC2F67303}" type="presOf" srcId="{62F9CE2C-EF1C-7141-AD91-BB931B7B6E01}" destId="{4A477F58-65EC-3743-8699-89515F4BA652}" srcOrd="1" destOrd="0" presId="urn:microsoft.com/office/officeart/2005/8/layout/list1"/>
-    <dgm:cxn modelId="{C62A1AE5-6DE1-0E4E-A4DA-E9DB1E0C16DF}" type="presOf" srcId="{C3BBC56F-4549-1849-A39E-12CB9B308CEF}" destId="{0A2618DB-9165-994E-B792-A0F450012729}" srcOrd="0" destOrd="2" presId="urn:microsoft.com/office/officeart/2005/8/layout/list1"/>
-    <dgm:cxn modelId="{7F41640B-E619-B446-AD1E-27684B7A3AE9}" srcId="{E4949E61-7429-4064-85AF-11B13624FC5C}" destId="{62F9CE2C-EF1C-7141-AD91-BB931B7B6E01}" srcOrd="1" destOrd="0" parTransId="{CB6558EC-E5AC-4A45-B6E5-BDD28147E88B}" sibTransId="{2AF37B29-350B-944F-8B54-4AD2471E9CCA}"/>
-    <dgm:cxn modelId="{63F16583-5F92-1C4D-A393-FAC1AA175230}" srcId="{62F9CE2C-EF1C-7141-AD91-BB931B7B6E01}" destId="{58D04AD0-AC8C-8D43-9B7E-BB09843B6436}" srcOrd="0" destOrd="0" parTransId="{898243F4-311E-EB46-9EEB-688FEDA9914A}" sibTransId="{9568C0C1-0C58-5A4B-9BD3-5A30FEFF2531}"/>
-    <dgm:cxn modelId="{31054224-46D2-8845-A8EB-729B0A52FF8F}" srcId="{08A195A3-C402-E340-8746-2070BAAA8FCA}" destId="{603CF1F2-27E0-2645-BC24-DC36A765FE74}" srcOrd="1" destOrd="0" parTransId="{9E864A3D-1A78-1447-9A4A-C7BADDC6719E}" sibTransId="{8DA2A30A-1D2F-7342-B9F8-0DCFA5ADE908}"/>
-    <dgm:cxn modelId="{271F991E-9BA1-6848-B4B7-0181E8F72608}" type="presOf" srcId="{62F9CE2C-EF1C-7141-AD91-BB931B7B6E01}" destId="{81A8EB38-B1A4-AE41-A2A7-8E54CD54F91A}" srcOrd="0" destOrd="0" presId="urn:microsoft.com/office/officeart/2005/8/layout/list1"/>
-    <dgm:cxn modelId="{DF7D4194-A0A2-4E4E-8F92-85122B73D735}" type="presOf" srcId="{E4949E61-7429-4064-85AF-11B13624FC5C}" destId="{4703772F-8068-4BD3-AAB9-763FB9F544EB}" srcOrd="0" destOrd="0" presId="urn:microsoft.com/office/officeart/2005/8/layout/list1"/>
-    <dgm:cxn modelId="{6D81DAC6-4577-4E44-9214-AC12436D56F0}" type="presOf" srcId="{E4D52DD6-8E93-DA47-861B-070DF189DD2E}" destId="{BDF6B77D-5100-414E-ACAD-FCD248D7259D}" srcOrd="1" destOrd="0" presId="urn:microsoft.com/office/officeart/2005/8/layout/list1"/>
     <dgm:cxn modelId="{835E3842-FF27-BA4F-A374-FAA3EB960288}" type="presParOf" srcId="{4703772F-8068-4BD3-AAB9-763FB9F544EB}" destId="{4982A576-F20B-624F-8EB6-02D4DAAA5318}" srcOrd="0" destOrd="0" presId="urn:microsoft.com/office/officeart/2005/8/layout/list1"/>
     <dgm:cxn modelId="{298E8D95-F8D5-B740-B48B-23494018517F}" type="presParOf" srcId="{4982A576-F20B-624F-8EB6-02D4DAAA5318}" destId="{4C862E51-229B-B143-8B2D-1791FDEB29A4}" srcOrd="0" destOrd="0" presId="urn:microsoft.com/office/officeart/2005/8/layout/list1"/>
     <dgm:cxn modelId="{6ADF25C1-C12C-654E-A023-A9367FD48EB3}" type="presParOf" srcId="{4982A576-F20B-624F-8EB6-02D4DAAA5318}" destId="{BDF6B77D-5100-414E-ACAD-FCD248D7259D}" srcOrd="1" destOrd="0" presId="urn:microsoft.com/office/officeart/2005/8/layout/list1"/>
@@ -3551,6 +3586,13 @@
     <dgm:pt modelId="{8328479A-9310-FB4B-8E25-4D338A95854A}" type="pres">
       <dgm:prSet presAssocID="{76340034-E1E8-FC4D-A35C-E17C80EFB16C}" presName="parentLeftMargin" presStyleLbl="node1" presStyleIdx="0" presStyleCnt="2"/>
       <dgm:spPr/>
+      <dgm:t>
+        <a:bodyPr/>
+        <a:lstStyle/>
+        <a:p>
+          <a:endParaRPr lang="en-US"/>
+        </a:p>
+      </dgm:t>
     </dgm:pt>
     <dgm:pt modelId="{6124FAE7-08EF-A24D-804F-D893AF9AC3FE}" type="pres">
       <dgm:prSet presAssocID="{76340034-E1E8-FC4D-A35C-E17C80EFB16C}" presName="parentText" presStyleLbl="node1" presStyleIdx="0" presStyleCnt="2">
@@ -3560,6 +3602,13 @@
         </dgm:presLayoutVars>
       </dgm:prSet>
       <dgm:spPr/>
+      <dgm:t>
+        <a:bodyPr/>
+        <a:lstStyle/>
+        <a:p>
+          <a:endParaRPr lang="en-US"/>
+        </a:p>
+      </dgm:t>
     </dgm:pt>
     <dgm:pt modelId="{8CDD9A78-D069-284F-9967-CD4E07FAC367}" type="pres">
       <dgm:prSet presAssocID="{76340034-E1E8-FC4D-A35C-E17C80EFB16C}" presName="negativeSpace" presStyleCnt="0"/>
@@ -3591,6 +3640,13 @@
     <dgm:pt modelId="{244D6708-6210-B84C-8C3D-FA57A3C97A20}" type="pres">
       <dgm:prSet presAssocID="{66531A41-2D1F-BC42-BEFA-AC38CBDACA6C}" presName="parentLeftMargin" presStyleLbl="node1" presStyleIdx="0" presStyleCnt="2"/>
       <dgm:spPr/>
+      <dgm:t>
+        <a:bodyPr/>
+        <a:lstStyle/>
+        <a:p>
+          <a:endParaRPr lang="en-US"/>
+        </a:p>
+      </dgm:t>
     </dgm:pt>
     <dgm:pt modelId="{64ECDE02-797D-854F-B0BA-959D033CB079}" type="pres">
       <dgm:prSet presAssocID="{66531A41-2D1F-BC42-BEFA-AC38CBDACA6C}" presName="parentText" presStyleLbl="node1" presStyleIdx="1" presStyleCnt="2">
@@ -3600,6 +3656,13 @@
         </dgm:presLayoutVars>
       </dgm:prSet>
       <dgm:spPr/>
+      <dgm:t>
+        <a:bodyPr/>
+        <a:lstStyle/>
+        <a:p>
+          <a:endParaRPr lang="en-US"/>
+        </a:p>
+      </dgm:t>
     </dgm:pt>
     <dgm:pt modelId="{449DBF6D-81CC-3547-958B-AA43AFE3F2DF}" type="pres">
       <dgm:prSet presAssocID="{66531A41-2D1F-BC42-BEFA-AC38CBDACA6C}" presName="negativeSpace" presStyleCnt="0"/>
@@ -3622,16 +3685,16 @@
     </dgm:pt>
   </dgm:ptLst>
   <dgm:cxnLst>
+    <dgm:cxn modelId="{E30C880A-5389-E541-AD0F-1B170FAAD0E3}" type="presOf" srcId="{E4949E61-7429-4064-85AF-11B13624FC5C}" destId="{4703772F-8068-4BD3-AAB9-763FB9F544EB}" srcOrd="0" destOrd="0" presId="urn:microsoft.com/office/officeart/2005/8/layout/list1"/>
+    <dgm:cxn modelId="{D75D7362-6111-B149-958F-4F8F1737A1B3}" type="presOf" srcId="{76340034-E1E8-FC4D-A35C-E17C80EFB16C}" destId="{8328479A-9310-FB4B-8E25-4D338A95854A}" srcOrd="0" destOrd="0" presId="urn:microsoft.com/office/officeart/2005/8/layout/list1"/>
+    <dgm:cxn modelId="{BCAD2287-281D-604F-B8A6-E1C9273CF171}" type="presOf" srcId="{66531A41-2D1F-BC42-BEFA-AC38CBDACA6C}" destId="{64ECDE02-797D-854F-B0BA-959D033CB079}" srcOrd="1" destOrd="0" presId="urn:microsoft.com/office/officeart/2005/8/layout/list1"/>
+    <dgm:cxn modelId="{B4EE146A-2856-7240-B379-8ECA1B0DBA34}" srcId="{76340034-E1E8-FC4D-A35C-E17C80EFB16C}" destId="{64634856-D701-0A46-B6F1-43F64DC4E246}" srcOrd="0" destOrd="0" parTransId="{01071748-9072-1E41-A5E9-BE5B9B141DB7}" sibTransId="{FCB3B531-1F16-DA47-86C8-90DAAD775806}"/>
+    <dgm:cxn modelId="{25EDF2B8-C1BC-4F4E-86C4-742D6B2989DE}" type="presOf" srcId="{64634856-D701-0A46-B6F1-43F64DC4E246}" destId="{C0B6BF1A-1C6B-AB49-BFDB-0212AD35F492}" srcOrd="0" destOrd="0" presId="urn:microsoft.com/office/officeart/2005/8/layout/list1"/>
+    <dgm:cxn modelId="{987A9155-D9F9-5B4B-8C16-BABAC6EEF663}" type="presOf" srcId="{83173FD8-49E5-2D42-B754-38B897F6AA19}" destId="{3ED39942-9D9D-294A-B487-0383E781811E}" srcOrd="0" destOrd="0" presId="urn:microsoft.com/office/officeart/2005/8/layout/list1"/>
+    <dgm:cxn modelId="{3380D456-0D6A-A841-81B3-975299F9DD76}" type="presOf" srcId="{66531A41-2D1F-BC42-BEFA-AC38CBDACA6C}" destId="{244D6708-6210-B84C-8C3D-FA57A3C97A20}" srcOrd="0" destOrd="0" presId="urn:microsoft.com/office/officeart/2005/8/layout/list1"/>
+    <dgm:cxn modelId="{7007C35B-CF01-9C43-9F7A-E3F77F6A43A8}" srcId="{E4949E61-7429-4064-85AF-11B13624FC5C}" destId="{66531A41-2D1F-BC42-BEFA-AC38CBDACA6C}" srcOrd="1" destOrd="0" parTransId="{E73D114D-F33A-324E-BE09-C68E13B6684F}" sibTransId="{F5B5EE95-C013-2A49-8BAF-F45E3BD50DB2}"/>
     <dgm:cxn modelId="{39D934A1-41D5-CA42-A31D-8A556011B691}" srcId="{66531A41-2D1F-BC42-BEFA-AC38CBDACA6C}" destId="{83173FD8-49E5-2D42-B754-38B897F6AA19}" srcOrd="0" destOrd="0" parTransId="{1E3FFC1E-68C4-2F43-B489-F04B3EB2403E}" sibTransId="{136E8876-06B0-1540-967B-8B600ECD7BE9}"/>
-    <dgm:cxn modelId="{3380D456-0D6A-A841-81B3-975299F9DD76}" type="presOf" srcId="{66531A41-2D1F-BC42-BEFA-AC38CBDACA6C}" destId="{244D6708-6210-B84C-8C3D-FA57A3C97A20}" srcOrd="0" destOrd="0" presId="urn:microsoft.com/office/officeart/2005/8/layout/list1"/>
-    <dgm:cxn modelId="{BCAD2287-281D-604F-B8A6-E1C9273CF171}" type="presOf" srcId="{66531A41-2D1F-BC42-BEFA-AC38CBDACA6C}" destId="{64ECDE02-797D-854F-B0BA-959D033CB079}" srcOrd="1" destOrd="0" presId="urn:microsoft.com/office/officeart/2005/8/layout/list1"/>
-    <dgm:cxn modelId="{E30C880A-5389-E541-AD0F-1B170FAAD0E3}" type="presOf" srcId="{E4949E61-7429-4064-85AF-11B13624FC5C}" destId="{4703772F-8068-4BD3-AAB9-763FB9F544EB}" srcOrd="0" destOrd="0" presId="urn:microsoft.com/office/officeart/2005/8/layout/list1"/>
     <dgm:cxn modelId="{CA977128-4A9C-2843-9A93-3F3C1CB0DF98}" srcId="{E4949E61-7429-4064-85AF-11B13624FC5C}" destId="{76340034-E1E8-FC4D-A35C-E17C80EFB16C}" srcOrd="0" destOrd="0" parTransId="{CEA0067C-075E-B24F-A685-FBB873BDBF5E}" sibTransId="{6944CFD7-3210-9244-8F50-02BEE187A72C}"/>
-    <dgm:cxn modelId="{987A9155-D9F9-5B4B-8C16-BABAC6EEF663}" type="presOf" srcId="{83173FD8-49E5-2D42-B754-38B897F6AA19}" destId="{3ED39942-9D9D-294A-B487-0383E781811E}" srcOrd="0" destOrd="0" presId="urn:microsoft.com/office/officeart/2005/8/layout/list1"/>
-    <dgm:cxn modelId="{7007C35B-CF01-9C43-9F7A-E3F77F6A43A8}" srcId="{E4949E61-7429-4064-85AF-11B13624FC5C}" destId="{66531A41-2D1F-BC42-BEFA-AC38CBDACA6C}" srcOrd="1" destOrd="0" parTransId="{E73D114D-F33A-324E-BE09-C68E13B6684F}" sibTransId="{F5B5EE95-C013-2A49-8BAF-F45E3BD50DB2}"/>
-    <dgm:cxn modelId="{25EDF2B8-C1BC-4F4E-86C4-742D6B2989DE}" type="presOf" srcId="{64634856-D701-0A46-B6F1-43F64DC4E246}" destId="{C0B6BF1A-1C6B-AB49-BFDB-0212AD35F492}" srcOrd="0" destOrd="0" presId="urn:microsoft.com/office/officeart/2005/8/layout/list1"/>
-    <dgm:cxn modelId="{D75D7362-6111-B149-958F-4F8F1737A1B3}" type="presOf" srcId="{76340034-E1E8-FC4D-A35C-E17C80EFB16C}" destId="{8328479A-9310-FB4B-8E25-4D338A95854A}" srcOrd="0" destOrd="0" presId="urn:microsoft.com/office/officeart/2005/8/layout/list1"/>
-    <dgm:cxn modelId="{B4EE146A-2856-7240-B379-8ECA1B0DBA34}" srcId="{76340034-E1E8-FC4D-A35C-E17C80EFB16C}" destId="{64634856-D701-0A46-B6F1-43F64DC4E246}" srcOrd="0" destOrd="0" parTransId="{01071748-9072-1E41-A5E9-BE5B9B141DB7}" sibTransId="{FCB3B531-1F16-DA47-86C8-90DAAD775806}"/>
     <dgm:cxn modelId="{DF691897-EC31-0A4B-ADF0-55188D4BD68C}" type="presOf" srcId="{76340034-E1E8-FC4D-A35C-E17C80EFB16C}" destId="{6124FAE7-08EF-A24D-804F-D893AF9AC3FE}" srcOrd="1" destOrd="0" presId="urn:microsoft.com/office/officeart/2005/8/layout/list1"/>
     <dgm:cxn modelId="{17A86A98-E076-0449-AEBD-1D2E58EDC92F}" type="presParOf" srcId="{4703772F-8068-4BD3-AAB9-763FB9F544EB}" destId="{B0FD5CE2-4F84-CB4B-AF48-B6F1E1D5A4CB}" srcOrd="0" destOrd="0" presId="urn:microsoft.com/office/officeart/2005/8/layout/list1"/>
     <dgm:cxn modelId="{1BDF7BD6-BF3C-8248-8B0D-6441765B0E9D}" type="presParOf" srcId="{B0FD5CE2-4F84-CB4B-AF48-B6F1E1D5A4CB}" destId="{8328479A-9310-FB4B-8E25-4D338A95854A}" srcOrd="0" destOrd="0" presId="urn:microsoft.com/office/officeart/2005/8/layout/list1"/>
@@ -12451,126 +12514,149 @@
           </a:p>
         </p:txBody>
       </p:sp>
-      <p:pic>
-        <p:nvPicPr>
-          <p:cNvPr id="11" name="Picture 10"/>
-          <p:cNvPicPr>
-            <a:picLocks noChangeAspect="1"/>
-          </p:cNvPicPr>
+      <p:grpSp>
+        <p:nvGrpSpPr>
+          <p:cNvPr id="2" name="Group 1"/>
+          <p:cNvGrpSpPr/>
           <p:nvPr/>
-        </p:nvPicPr>
-        <p:blipFill>
-          <a:blip r:embed="rId4">
-            <a:extLst>
-              <a:ext uri="{28A0092B-C50C-407E-A947-70E740481C1C}">
-                <a14:useLocalDpi xmlns:a14="http://schemas.microsoft.com/office/drawing/2010/main" val="0"/>
-              </a:ext>
-            </a:extLst>
-          </a:blip>
-          <a:stretch>
-            <a:fillRect/>
-          </a:stretch>
-        </p:blipFill>
-        <p:spPr>
+        </p:nvGrpSpPr>
+        <p:grpSpPr>
           <a:xfrm>
-            <a:off x="4077161" y="1256308"/>
-            <a:ext cx="518085" cy="338713"/>
+            <a:off x="1787897" y="1204256"/>
+            <a:ext cx="3897986" cy="390766"/>
+            <a:chOff x="1787897" y="1204256"/>
+            <a:chExt cx="3897986" cy="390766"/>
           </a:xfrm>
-          <a:prstGeom prst="rect">
-            <a:avLst/>
-          </a:prstGeom>
-        </p:spPr>
-      </p:pic>
-      <p:pic>
-        <p:nvPicPr>
-          <p:cNvPr id="12" name="Picture 11"/>
-          <p:cNvPicPr>
-            <a:picLocks noChangeAspect="1"/>
-          </p:cNvPicPr>
-          <p:nvPr/>
-        </p:nvPicPr>
-        <p:blipFill>
-          <a:blip r:embed="rId5">
-            <a:extLst>
-              <a:ext uri="{28A0092B-C50C-407E-A947-70E740481C1C}">
-                <a14:useLocalDpi xmlns:a14="http://schemas.microsoft.com/office/drawing/2010/main" val="0"/>
-              </a:ext>
-            </a:extLst>
-          </a:blip>
-          <a:stretch>
-            <a:fillRect/>
-          </a:stretch>
-        </p:blipFill>
-        <p:spPr>
-          <a:xfrm>
-            <a:off x="2953234" y="1256308"/>
-            <a:ext cx="430568" cy="338713"/>
-          </a:xfrm>
-          <a:prstGeom prst="rect">
-            <a:avLst/>
-          </a:prstGeom>
-        </p:spPr>
-      </p:pic>
-      <p:pic>
-        <p:nvPicPr>
-          <p:cNvPr id="13" name="Picture 12"/>
-          <p:cNvPicPr>
-            <a:picLocks noChangeAspect="1"/>
-          </p:cNvPicPr>
-          <p:nvPr/>
-        </p:nvPicPr>
-        <p:blipFill>
-          <a:blip r:embed="rId6">
-            <a:extLst>
-              <a:ext uri="{28A0092B-C50C-407E-A947-70E740481C1C}">
-                <a14:useLocalDpi xmlns:a14="http://schemas.microsoft.com/office/drawing/2010/main" val="0"/>
-              </a:ext>
-            </a:extLst>
-          </a:blip>
-          <a:stretch>
-            <a:fillRect/>
-          </a:stretch>
-        </p:blipFill>
-        <p:spPr>
-          <a:xfrm>
-            <a:off x="1787897" y="1256309"/>
-            <a:ext cx="471977" cy="338713"/>
-          </a:xfrm>
-          <a:prstGeom prst="rect">
-            <a:avLst/>
-          </a:prstGeom>
-        </p:spPr>
-      </p:pic>
-      <p:pic>
-        <p:nvPicPr>
-          <p:cNvPr id="14" name="Picture 13"/>
-          <p:cNvPicPr>
-            <a:picLocks noChangeAspect="1"/>
-          </p:cNvPicPr>
-          <p:nvPr/>
-        </p:nvPicPr>
-        <p:blipFill>
-          <a:blip r:embed="rId7">
-            <a:extLst>
-              <a:ext uri="{28A0092B-C50C-407E-A947-70E740481C1C}">
-                <a14:useLocalDpi xmlns:a14="http://schemas.microsoft.com/office/drawing/2010/main" val="0"/>
-              </a:ext>
-            </a:extLst>
-          </a:blip>
-          <a:stretch>
-            <a:fillRect/>
-          </a:stretch>
-        </p:blipFill>
-        <p:spPr>
-          <a:xfrm>
-            <a:off x="5288605" y="1204256"/>
-            <a:ext cx="397278" cy="390765"/>
-          </a:xfrm>
-          <a:prstGeom prst="rect">
-            <a:avLst/>
-          </a:prstGeom>
-        </p:spPr>
-      </p:pic>
+        </p:grpSpPr>
+        <p:pic>
+          <p:nvPicPr>
+            <p:cNvPr id="11" name="Picture 10">
+              <a:hlinkClick r:id="rId4" action="ppaction://hlinksldjump"/>
+            </p:cNvPr>
+            <p:cNvPicPr>
+              <a:picLocks noChangeAspect="1"/>
+            </p:cNvPicPr>
+            <p:nvPr/>
+          </p:nvPicPr>
+          <p:blipFill>
+            <a:blip r:embed="rId5">
+              <a:extLst>
+                <a:ext uri="{28A0092B-C50C-407E-A947-70E740481C1C}">
+                  <a14:useLocalDpi xmlns:a14="http://schemas.microsoft.com/office/drawing/2010/main" val="0"/>
+                </a:ext>
+              </a:extLst>
+            </a:blip>
+            <a:stretch>
+              <a:fillRect/>
+            </a:stretch>
+          </p:blipFill>
+          <p:spPr>
+            <a:xfrm>
+              <a:off x="4067222" y="1256308"/>
+              <a:ext cx="518085" cy="338713"/>
+            </a:xfrm>
+            <a:prstGeom prst="rect">
+              <a:avLst/>
+            </a:prstGeom>
+          </p:spPr>
+        </p:pic>
+        <p:pic>
+          <p:nvPicPr>
+            <p:cNvPr id="12" name="Picture 11">
+              <a:hlinkClick r:id="rId6" action="ppaction://hlinksldjump"/>
+            </p:cNvPr>
+            <p:cNvPicPr>
+              <a:picLocks noChangeAspect="1"/>
+            </p:cNvPicPr>
+            <p:nvPr/>
+          </p:nvPicPr>
+          <p:blipFill>
+            <a:blip r:embed="rId7">
+              <a:extLst>
+                <a:ext uri="{28A0092B-C50C-407E-A947-70E740481C1C}">
+                  <a14:useLocalDpi xmlns:a14="http://schemas.microsoft.com/office/drawing/2010/main" val="0"/>
+                </a:ext>
+              </a:extLst>
+            </a:blip>
+            <a:stretch>
+              <a:fillRect/>
+            </a:stretch>
+          </p:blipFill>
+          <p:spPr>
+            <a:xfrm>
+              <a:off x="2953234" y="1256308"/>
+              <a:ext cx="430568" cy="338713"/>
+            </a:xfrm>
+            <a:prstGeom prst="rect">
+              <a:avLst/>
+            </a:prstGeom>
+          </p:spPr>
+        </p:pic>
+        <p:pic>
+          <p:nvPicPr>
+            <p:cNvPr id="13" name="Picture 12">
+              <a:hlinkClick r:id="rId8" action="ppaction://hlinksldjump"/>
+            </p:cNvPr>
+            <p:cNvPicPr>
+              <a:picLocks noChangeAspect="1"/>
+            </p:cNvPicPr>
+            <p:nvPr/>
+          </p:nvPicPr>
+          <p:blipFill>
+            <a:blip r:embed="rId9">
+              <a:extLst>
+                <a:ext uri="{28A0092B-C50C-407E-A947-70E740481C1C}">
+                  <a14:useLocalDpi xmlns:a14="http://schemas.microsoft.com/office/drawing/2010/main" val="0"/>
+                </a:ext>
+              </a:extLst>
+            </a:blip>
+            <a:stretch>
+              <a:fillRect/>
+            </a:stretch>
+          </p:blipFill>
+          <p:spPr>
+            <a:xfrm>
+              <a:off x="1787897" y="1256309"/>
+              <a:ext cx="471977" cy="338713"/>
+            </a:xfrm>
+            <a:prstGeom prst="rect">
+              <a:avLst/>
+            </a:prstGeom>
+          </p:spPr>
+        </p:pic>
+        <p:pic>
+          <p:nvPicPr>
+            <p:cNvPr id="14" name="Picture 13">
+              <a:hlinkClick r:id="rId10" action="ppaction://hlinksldjump"/>
+            </p:cNvPr>
+            <p:cNvPicPr>
+              <a:picLocks noChangeAspect="1"/>
+            </p:cNvPicPr>
+            <p:nvPr/>
+          </p:nvPicPr>
+          <p:blipFill>
+            <a:blip r:embed="rId11">
+              <a:extLst>
+                <a:ext uri="{28A0092B-C50C-407E-A947-70E740481C1C}">
+                  <a14:useLocalDpi xmlns:a14="http://schemas.microsoft.com/office/drawing/2010/main" val="0"/>
+                </a:ext>
+              </a:extLst>
+            </a:blip>
+            <a:stretch>
+              <a:fillRect/>
+            </a:stretch>
+          </p:blipFill>
+          <p:spPr>
+            <a:xfrm>
+              <a:off x="5288605" y="1204256"/>
+              <a:ext cx="397278" cy="390765"/>
+            </a:xfrm>
+            <a:prstGeom prst="rect">
+              <a:avLst/>
+            </a:prstGeom>
+          </p:spPr>
+        </p:pic>
+      </p:grpSp>
       <p:sp>
         <p:nvSpPr>
           <p:cNvPr id="15" name="Rectangle 14"/>
@@ -12792,7 +12878,7 @@
       <p:sp>
         <p:nvSpPr>
           <p:cNvPr id="23" name="Rounded Rectangle 22">
-            <a:hlinkClick r:id="rId8" action="ppaction://hlinksldjump"/>
+            <a:hlinkClick r:id="rId12" action="ppaction://hlinksldjump"/>
           </p:cNvPr>
           <p:cNvSpPr/>
           <p:nvPr/>
@@ -13336,126 +13422,6 @@
           </a:p>
         </p:txBody>
       </p:sp>
-      <p:pic>
-        <p:nvPicPr>
-          <p:cNvPr id="11" name="Picture 10"/>
-          <p:cNvPicPr>
-            <a:picLocks noChangeAspect="1"/>
-          </p:cNvPicPr>
-          <p:nvPr/>
-        </p:nvPicPr>
-        <p:blipFill>
-          <a:blip r:embed="rId4">
-            <a:extLst>
-              <a:ext uri="{28A0092B-C50C-407E-A947-70E740481C1C}">
-                <a14:useLocalDpi xmlns:a14="http://schemas.microsoft.com/office/drawing/2010/main" val="0"/>
-              </a:ext>
-            </a:extLst>
-          </a:blip>
-          <a:stretch>
-            <a:fillRect/>
-          </a:stretch>
-        </p:blipFill>
-        <p:spPr>
-          <a:xfrm>
-            <a:off x="4077161" y="1256308"/>
-            <a:ext cx="518085" cy="338713"/>
-          </a:xfrm>
-          <a:prstGeom prst="rect">
-            <a:avLst/>
-          </a:prstGeom>
-        </p:spPr>
-      </p:pic>
-      <p:pic>
-        <p:nvPicPr>
-          <p:cNvPr id="12" name="Picture 11"/>
-          <p:cNvPicPr>
-            <a:picLocks noChangeAspect="1"/>
-          </p:cNvPicPr>
-          <p:nvPr/>
-        </p:nvPicPr>
-        <p:blipFill>
-          <a:blip r:embed="rId5">
-            <a:extLst>
-              <a:ext uri="{28A0092B-C50C-407E-A947-70E740481C1C}">
-                <a14:useLocalDpi xmlns:a14="http://schemas.microsoft.com/office/drawing/2010/main" val="0"/>
-              </a:ext>
-            </a:extLst>
-          </a:blip>
-          <a:stretch>
-            <a:fillRect/>
-          </a:stretch>
-        </p:blipFill>
-        <p:spPr>
-          <a:xfrm>
-            <a:off x="2953234" y="1256308"/>
-            <a:ext cx="430568" cy="338713"/>
-          </a:xfrm>
-          <a:prstGeom prst="rect">
-            <a:avLst/>
-          </a:prstGeom>
-        </p:spPr>
-      </p:pic>
-      <p:pic>
-        <p:nvPicPr>
-          <p:cNvPr id="13" name="Picture 12"/>
-          <p:cNvPicPr>
-            <a:picLocks noChangeAspect="1"/>
-          </p:cNvPicPr>
-          <p:nvPr/>
-        </p:nvPicPr>
-        <p:blipFill>
-          <a:blip r:embed="rId6">
-            <a:extLst>
-              <a:ext uri="{28A0092B-C50C-407E-A947-70E740481C1C}">
-                <a14:useLocalDpi xmlns:a14="http://schemas.microsoft.com/office/drawing/2010/main" val="0"/>
-              </a:ext>
-            </a:extLst>
-          </a:blip>
-          <a:stretch>
-            <a:fillRect/>
-          </a:stretch>
-        </p:blipFill>
-        <p:spPr>
-          <a:xfrm>
-            <a:off x="1787897" y="1256309"/>
-            <a:ext cx="471977" cy="338713"/>
-          </a:xfrm>
-          <a:prstGeom prst="rect">
-            <a:avLst/>
-          </a:prstGeom>
-        </p:spPr>
-      </p:pic>
-      <p:pic>
-        <p:nvPicPr>
-          <p:cNvPr id="14" name="Picture 13"/>
-          <p:cNvPicPr>
-            <a:picLocks noChangeAspect="1"/>
-          </p:cNvPicPr>
-          <p:nvPr/>
-        </p:nvPicPr>
-        <p:blipFill>
-          <a:blip r:embed="rId7">
-            <a:extLst>
-              <a:ext uri="{28A0092B-C50C-407E-A947-70E740481C1C}">
-                <a14:useLocalDpi xmlns:a14="http://schemas.microsoft.com/office/drawing/2010/main" val="0"/>
-              </a:ext>
-            </a:extLst>
-          </a:blip>
-          <a:stretch>
-            <a:fillRect/>
-          </a:stretch>
-        </p:blipFill>
-        <p:spPr>
-          <a:xfrm>
-            <a:off x="5288605" y="1204256"/>
-            <a:ext cx="397278" cy="390765"/>
-          </a:xfrm>
-          <a:prstGeom prst="rect">
-            <a:avLst/>
-          </a:prstGeom>
-        </p:spPr>
-      </p:pic>
       <p:sp>
         <p:nvSpPr>
           <p:cNvPr id="15" name="Rectangle 14"/>
@@ -13677,7 +13643,7 @@
       <p:sp>
         <p:nvSpPr>
           <p:cNvPr id="23" name="Rounded Rectangle 22">
-            <a:hlinkClick r:id="rId8" action="ppaction://hlinksldjump"/>
+            <a:hlinkClick r:id="rId4" action="ppaction://hlinksldjump"/>
           </p:cNvPr>
           <p:cNvSpPr/>
           <p:nvPr/>
@@ -13825,6 +13791,149 @@
           </a:p>
         </p:txBody>
       </p:sp>
+      <p:grpSp>
+        <p:nvGrpSpPr>
+          <p:cNvPr id="25" name="Group 24"/>
+          <p:cNvGrpSpPr/>
+          <p:nvPr/>
+        </p:nvGrpSpPr>
+        <p:grpSpPr>
+          <a:xfrm>
+            <a:off x="1787897" y="1204256"/>
+            <a:ext cx="3897986" cy="390766"/>
+            <a:chOff x="1787897" y="1204256"/>
+            <a:chExt cx="3897986" cy="390766"/>
+          </a:xfrm>
+        </p:grpSpPr>
+        <p:pic>
+          <p:nvPicPr>
+            <p:cNvPr id="26" name="Picture 25">
+              <a:hlinkClick r:id="rId5" action="ppaction://hlinksldjump"/>
+            </p:cNvPr>
+            <p:cNvPicPr>
+              <a:picLocks noChangeAspect="1"/>
+            </p:cNvPicPr>
+            <p:nvPr/>
+          </p:nvPicPr>
+          <p:blipFill>
+            <a:blip r:embed="rId6">
+              <a:extLst>
+                <a:ext uri="{28A0092B-C50C-407E-A947-70E740481C1C}">
+                  <a14:useLocalDpi xmlns:a14="http://schemas.microsoft.com/office/drawing/2010/main" val="0"/>
+                </a:ext>
+              </a:extLst>
+            </a:blip>
+            <a:stretch>
+              <a:fillRect/>
+            </a:stretch>
+          </p:blipFill>
+          <p:spPr>
+            <a:xfrm>
+              <a:off x="4067222" y="1256308"/>
+              <a:ext cx="518085" cy="338713"/>
+            </a:xfrm>
+            <a:prstGeom prst="rect">
+              <a:avLst/>
+            </a:prstGeom>
+          </p:spPr>
+        </p:pic>
+        <p:pic>
+          <p:nvPicPr>
+            <p:cNvPr id="27" name="Picture 26">
+              <a:hlinkClick r:id="rId7" action="ppaction://hlinksldjump"/>
+            </p:cNvPr>
+            <p:cNvPicPr>
+              <a:picLocks noChangeAspect="1"/>
+            </p:cNvPicPr>
+            <p:nvPr/>
+          </p:nvPicPr>
+          <p:blipFill>
+            <a:blip r:embed="rId8">
+              <a:extLst>
+                <a:ext uri="{28A0092B-C50C-407E-A947-70E740481C1C}">
+                  <a14:useLocalDpi xmlns:a14="http://schemas.microsoft.com/office/drawing/2010/main" val="0"/>
+                </a:ext>
+              </a:extLst>
+            </a:blip>
+            <a:stretch>
+              <a:fillRect/>
+            </a:stretch>
+          </p:blipFill>
+          <p:spPr>
+            <a:xfrm>
+              <a:off x="2953234" y="1256308"/>
+              <a:ext cx="430568" cy="338713"/>
+            </a:xfrm>
+            <a:prstGeom prst="rect">
+              <a:avLst/>
+            </a:prstGeom>
+          </p:spPr>
+        </p:pic>
+        <p:pic>
+          <p:nvPicPr>
+            <p:cNvPr id="28" name="Picture 27">
+              <a:hlinkClick r:id="rId9" action="ppaction://hlinksldjump"/>
+            </p:cNvPr>
+            <p:cNvPicPr>
+              <a:picLocks noChangeAspect="1"/>
+            </p:cNvPicPr>
+            <p:nvPr/>
+          </p:nvPicPr>
+          <p:blipFill>
+            <a:blip r:embed="rId10">
+              <a:extLst>
+                <a:ext uri="{28A0092B-C50C-407E-A947-70E740481C1C}">
+                  <a14:useLocalDpi xmlns:a14="http://schemas.microsoft.com/office/drawing/2010/main" val="0"/>
+                </a:ext>
+              </a:extLst>
+            </a:blip>
+            <a:stretch>
+              <a:fillRect/>
+            </a:stretch>
+          </p:blipFill>
+          <p:spPr>
+            <a:xfrm>
+              <a:off x="1787897" y="1256309"/>
+              <a:ext cx="471977" cy="338713"/>
+            </a:xfrm>
+            <a:prstGeom prst="rect">
+              <a:avLst/>
+            </a:prstGeom>
+          </p:spPr>
+        </p:pic>
+        <p:pic>
+          <p:nvPicPr>
+            <p:cNvPr id="29" name="Picture 28">
+              <a:hlinkClick r:id="rId11" action="ppaction://hlinksldjump"/>
+            </p:cNvPr>
+            <p:cNvPicPr>
+              <a:picLocks noChangeAspect="1"/>
+            </p:cNvPicPr>
+            <p:nvPr/>
+          </p:nvPicPr>
+          <p:blipFill>
+            <a:blip r:embed="rId12">
+              <a:extLst>
+                <a:ext uri="{28A0092B-C50C-407E-A947-70E740481C1C}">
+                  <a14:useLocalDpi xmlns:a14="http://schemas.microsoft.com/office/drawing/2010/main" val="0"/>
+                </a:ext>
+              </a:extLst>
+            </a:blip>
+            <a:stretch>
+              <a:fillRect/>
+            </a:stretch>
+          </p:blipFill>
+          <p:spPr>
+            <a:xfrm>
+              <a:off x="5288605" y="1204256"/>
+              <a:ext cx="397278" cy="390765"/>
+            </a:xfrm>
+            <a:prstGeom prst="rect">
+              <a:avLst/>
+            </a:prstGeom>
+          </p:spPr>
+        </p:pic>
+      </p:grpSp>
     </p:spTree>
     <p:extLst>
       <p:ext uri="{BB962C8B-B14F-4D97-AF65-F5344CB8AC3E}">
@@ -14221,126 +14330,6 @@
           </a:p>
         </p:txBody>
       </p:sp>
-      <p:pic>
-        <p:nvPicPr>
-          <p:cNvPr id="11" name="Picture 10"/>
-          <p:cNvPicPr>
-            <a:picLocks noChangeAspect="1"/>
-          </p:cNvPicPr>
-          <p:nvPr/>
-        </p:nvPicPr>
-        <p:blipFill>
-          <a:blip r:embed="rId4">
-            <a:extLst>
-              <a:ext uri="{28A0092B-C50C-407E-A947-70E740481C1C}">
-                <a14:useLocalDpi xmlns:a14="http://schemas.microsoft.com/office/drawing/2010/main" val="0"/>
-              </a:ext>
-            </a:extLst>
-          </a:blip>
-          <a:stretch>
-            <a:fillRect/>
-          </a:stretch>
-        </p:blipFill>
-        <p:spPr>
-          <a:xfrm>
-            <a:off x="4077161" y="1256308"/>
-            <a:ext cx="518085" cy="338713"/>
-          </a:xfrm>
-          <a:prstGeom prst="rect">
-            <a:avLst/>
-          </a:prstGeom>
-        </p:spPr>
-      </p:pic>
-      <p:pic>
-        <p:nvPicPr>
-          <p:cNvPr id="12" name="Picture 11"/>
-          <p:cNvPicPr>
-            <a:picLocks noChangeAspect="1"/>
-          </p:cNvPicPr>
-          <p:nvPr/>
-        </p:nvPicPr>
-        <p:blipFill>
-          <a:blip r:embed="rId5">
-            <a:extLst>
-              <a:ext uri="{28A0092B-C50C-407E-A947-70E740481C1C}">
-                <a14:useLocalDpi xmlns:a14="http://schemas.microsoft.com/office/drawing/2010/main" val="0"/>
-              </a:ext>
-            </a:extLst>
-          </a:blip>
-          <a:stretch>
-            <a:fillRect/>
-          </a:stretch>
-        </p:blipFill>
-        <p:spPr>
-          <a:xfrm>
-            <a:off x="2953234" y="1256308"/>
-            <a:ext cx="430568" cy="338713"/>
-          </a:xfrm>
-          <a:prstGeom prst="rect">
-            <a:avLst/>
-          </a:prstGeom>
-        </p:spPr>
-      </p:pic>
-      <p:pic>
-        <p:nvPicPr>
-          <p:cNvPr id="13" name="Picture 12"/>
-          <p:cNvPicPr>
-            <a:picLocks noChangeAspect="1"/>
-          </p:cNvPicPr>
-          <p:nvPr/>
-        </p:nvPicPr>
-        <p:blipFill>
-          <a:blip r:embed="rId6">
-            <a:extLst>
-              <a:ext uri="{28A0092B-C50C-407E-A947-70E740481C1C}">
-                <a14:useLocalDpi xmlns:a14="http://schemas.microsoft.com/office/drawing/2010/main" val="0"/>
-              </a:ext>
-            </a:extLst>
-          </a:blip>
-          <a:stretch>
-            <a:fillRect/>
-          </a:stretch>
-        </p:blipFill>
-        <p:spPr>
-          <a:xfrm>
-            <a:off x="1787897" y="1256309"/>
-            <a:ext cx="471977" cy="338713"/>
-          </a:xfrm>
-          <a:prstGeom prst="rect">
-            <a:avLst/>
-          </a:prstGeom>
-        </p:spPr>
-      </p:pic>
-      <p:pic>
-        <p:nvPicPr>
-          <p:cNvPr id="14" name="Picture 13"/>
-          <p:cNvPicPr>
-            <a:picLocks noChangeAspect="1"/>
-          </p:cNvPicPr>
-          <p:nvPr/>
-        </p:nvPicPr>
-        <p:blipFill>
-          <a:blip r:embed="rId7">
-            <a:extLst>
-              <a:ext uri="{28A0092B-C50C-407E-A947-70E740481C1C}">
-                <a14:useLocalDpi xmlns:a14="http://schemas.microsoft.com/office/drawing/2010/main" val="0"/>
-              </a:ext>
-            </a:extLst>
-          </a:blip>
-          <a:stretch>
-            <a:fillRect/>
-          </a:stretch>
-        </p:blipFill>
-        <p:spPr>
-          <a:xfrm>
-            <a:off x="5288605" y="1204256"/>
-            <a:ext cx="397278" cy="390765"/>
-          </a:xfrm>
-          <a:prstGeom prst="rect">
-            <a:avLst/>
-          </a:prstGeom>
-        </p:spPr>
-      </p:pic>
       <p:sp>
         <p:nvSpPr>
           <p:cNvPr id="15" name="Rectangle 14"/>
@@ -14562,7 +14551,7 @@
       <p:sp>
         <p:nvSpPr>
           <p:cNvPr id="23" name="Rounded Rectangle 22">
-            <a:hlinkClick r:id="rId8" action="ppaction://hlinksldjump"/>
+            <a:hlinkClick r:id="rId4" action="ppaction://hlinksldjump"/>
           </p:cNvPr>
           <p:cNvSpPr/>
           <p:nvPr/>
@@ -14710,6 +14699,149 @@
           </a:p>
         </p:txBody>
       </p:sp>
+      <p:grpSp>
+        <p:nvGrpSpPr>
+          <p:cNvPr id="25" name="Group 24"/>
+          <p:cNvGrpSpPr/>
+          <p:nvPr/>
+        </p:nvGrpSpPr>
+        <p:grpSpPr>
+          <a:xfrm>
+            <a:off x="1787897" y="1204256"/>
+            <a:ext cx="3897986" cy="390766"/>
+            <a:chOff x="1787897" y="1204256"/>
+            <a:chExt cx="3897986" cy="390766"/>
+          </a:xfrm>
+        </p:grpSpPr>
+        <p:pic>
+          <p:nvPicPr>
+            <p:cNvPr id="26" name="Picture 25">
+              <a:hlinkClick r:id="rId5" action="ppaction://hlinksldjump"/>
+            </p:cNvPr>
+            <p:cNvPicPr>
+              <a:picLocks noChangeAspect="1"/>
+            </p:cNvPicPr>
+            <p:nvPr/>
+          </p:nvPicPr>
+          <p:blipFill>
+            <a:blip r:embed="rId6">
+              <a:extLst>
+                <a:ext uri="{28A0092B-C50C-407E-A947-70E740481C1C}">
+                  <a14:useLocalDpi xmlns:a14="http://schemas.microsoft.com/office/drawing/2010/main" val="0"/>
+                </a:ext>
+              </a:extLst>
+            </a:blip>
+            <a:stretch>
+              <a:fillRect/>
+            </a:stretch>
+          </p:blipFill>
+          <p:spPr>
+            <a:xfrm>
+              <a:off x="4067222" y="1256308"/>
+              <a:ext cx="518085" cy="338713"/>
+            </a:xfrm>
+            <a:prstGeom prst="rect">
+              <a:avLst/>
+            </a:prstGeom>
+          </p:spPr>
+        </p:pic>
+        <p:pic>
+          <p:nvPicPr>
+            <p:cNvPr id="27" name="Picture 26">
+              <a:hlinkClick r:id="rId7" action="ppaction://hlinksldjump"/>
+            </p:cNvPr>
+            <p:cNvPicPr>
+              <a:picLocks noChangeAspect="1"/>
+            </p:cNvPicPr>
+            <p:nvPr/>
+          </p:nvPicPr>
+          <p:blipFill>
+            <a:blip r:embed="rId8">
+              <a:extLst>
+                <a:ext uri="{28A0092B-C50C-407E-A947-70E740481C1C}">
+                  <a14:useLocalDpi xmlns:a14="http://schemas.microsoft.com/office/drawing/2010/main" val="0"/>
+                </a:ext>
+              </a:extLst>
+            </a:blip>
+            <a:stretch>
+              <a:fillRect/>
+            </a:stretch>
+          </p:blipFill>
+          <p:spPr>
+            <a:xfrm>
+              <a:off x="2953234" y="1256308"/>
+              <a:ext cx="430568" cy="338713"/>
+            </a:xfrm>
+            <a:prstGeom prst="rect">
+              <a:avLst/>
+            </a:prstGeom>
+          </p:spPr>
+        </p:pic>
+        <p:pic>
+          <p:nvPicPr>
+            <p:cNvPr id="28" name="Picture 27">
+              <a:hlinkClick r:id="rId9" action="ppaction://hlinksldjump"/>
+            </p:cNvPr>
+            <p:cNvPicPr>
+              <a:picLocks noChangeAspect="1"/>
+            </p:cNvPicPr>
+            <p:nvPr/>
+          </p:nvPicPr>
+          <p:blipFill>
+            <a:blip r:embed="rId10">
+              <a:extLst>
+                <a:ext uri="{28A0092B-C50C-407E-A947-70E740481C1C}">
+                  <a14:useLocalDpi xmlns:a14="http://schemas.microsoft.com/office/drawing/2010/main" val="0"/>
+                </a:ext>
+              </a:extLst>
+            </a:blip>
+            <a:stretch>
+              <a:fillRect/>
+            </a:stretch>
+          </p:blipFill>
+          <p:spPr>
+            <a:xfrm>
+              <a:off x="1787897" y="1256309"/>
+              <a:ext cx="471977" cy="338713"/>
+            </a:xfrm>
+            <a:prstGeom prst="rect">
+              <a:avLst/>
+            </a:prstGeom>
+          </p:spPr>
+        </p:pic>
+        <p:pic>
+          <p:nvPicPr>
+            <p:cNvPr id="29" name="Picture 28">
+              <a:hlinkClick r:id="rId11" action="ppaction://hlinksldjump"/>
+            </p:cNvPr>
+            <p:cNvPicPr>
+              <a:picLocks noChangeAspect="1"/>
+            </p:cNvPicPr>
+            <p:nvPr/>
+          </p:nvPicPr>
+          <p:blipFill>
+            <a:blip r:embed="rId12">
+              <a:extLst>
+                <a:ext uri="{28A0092B-C50C-407E-A947-70E740481C1C}">
+                  <a14:useLocalDpi xmlns:a14="http://schemas.microsoft.com/office/drawing/2010/main" val="0"/>
+                </a:ext>
+              </a:extLst>
+            </a:blip>
+            <a:stretch>
+              <a:fillRect/>
+            </a:stretch>
+          </p:blipFill>
+          <p:spPr>
+            <a:xfrm>
+              <a:off x="5288605" y="1204256"/>
+              <a:ext cx="397278" cy="390765"/>
+            </a:xfrm>
+            <a:prstGeom prst="rect">
+              <a:avLst/>
+            </a:prstGeom>
+          </p:spPr>
+        </p:pic>
+      </p:grpSp>
     </p:spTree>
     <p:extLst>
       <p:ext uri="{BB962C8B-B14F-4D97-AF65-F5344CB8AC3E}">
@@ -14882,62 +15014,6 @@
           </a:p>
         </p:txBody>
       </p:sp>
-      <p:sp>
-        <p:nvSpPr>
-          <p:cNvPr id="7" name="Rounded Rectangle 6">
-            <a:hlinkClick r:id="" action="ppaction://hlinkshowjump?jump=nextslide"/>
-          </p:cNvPr>
-          <p:cNvSpPr/>
-          <p:nvPr/>
-        </p:nvSpPr>
-        <p:spPr>
-          <a:xfrm>
-            <a:off x="7669108" y="6208289"/>
-            <a:ext cx="1236829" cy="457999"/>
-          </a:xfrm>
-          <a:prstGeom prst="roundRect">
-            <a:avLst/>
-          </a:prstGeom>
-          <a:solidFill>
-            <a:srgbClr val="000046"/>
-          </a:solidFill>
-          <a:effectLst>
-            <a:outerShdw blurRad="50800" dist="25400" dir="5400000" algn="ctr" rotWithShape="0">
-              <a:schemeClr val="tx2">
-                <a:lumMod val="75000"/>
-              </a:schemeClr>
-            </a:outerShdw>
-          </a:effectLst>
-        </p:spPr>
-        <p:style>
-          <a:lnRef idx="2">
-            <a:schemeClr val="accent1">
-              <a:shade val="50000"/>
-            </a:schemeClr>
-          </a:lnRef>
-          <a:fillRef idx="1">
-            <a:schemeClr val="accent1"/>
-          </a:fillRef>
-          <a:effectRef idx="0">
-            <a:schemeClr val="accent1"/>
-          </a:effectRef>
-          <a:fontRef idx="minor">
-            <a:schemeClr val="lt1"/>
-          </a:fontRef>
-        </p:style>
-        <p:txBody>
-          <a:bodyPr rtlCol="0" anchor="ctr"/>
-          <a:lstStyle/>
-          <a:p>
-            <a:pPr algn="ctr"/>
-            <a:r>
-              <a:rPr lang="en-US" dirty="0" smtClean="0"/>
-              <a:t>Next</a:t>
-            </a:r>
-            <a:endParaRPr lang="en-US" dirty="0"/>
-          </a:p>
-        </p:txBody>
-      </p:sp>
       <p:pic>
         <p:nvPicPr>
           <p:cNvPr id="8" name="Picture 7"/>
@@ -15091,126 +15167,6 @@
           </a:p>
         </p:txBody>
       </p:sp>
-      <p:pic>
-        <p:nvPicPr>
-          <p:cNvPr id="11" name="Picture 10"/>
-          <p:cNvPicPr>
-            <a:picLocks noChangeAspect="1"/>
-          </p:cNvPicPr>
-          <p:nvPr/>
-        </p:nvPicPr>
-        <p:blipFill>
-          <a:blip r:embed="rId4">
-            <a:extLst>
-              <a:ext uri="{28A0092B-C50C-407E-A947-70E740481C1C}">
-                <a14:useLocalDpi xmlns:a14="http://schemas.microsoft.com/office/drawing/2010/main" val="0"/>
-              </a:ext>
-            </a:extLst>
-          </a:blip>
-          <a:stretch>
-            <a:fillRect/>
-          </a:stretch>
-        </p:blipFill>
-        <p:spPr>
-          <a:xfrm>
-            <a:off x="4077161" y="1256308"/>
-            <a:ext cx="518085" cy="338713"/>
-          </a:xfrm>
-          <a:prstGeom prst="rect">
-            <a:avLst/>
-          </a:prstGeom>
-        </p:spPr>
-      </p:pic>
-      <p:pic>
-        <p:nvPicPr>
-          <p:cNvPr id="12" name="Picture 11"/>
-          <p:cNvPicPr>
-            <a:picLocks noChangeAspect="1"/>
-          </p:cNvPicPr>
-          <p:nvPr/>
-        </p:nvPicPr>
-        <p:blipFill>
-          <a:blip r:embed="rId5">
-            <a:extLst>
-              <a:ext uri="{28A0092B-C50C-407E-A947-70E740481C1C}">
-                <a14:useLocalDpi xmlns:a14="http://schemas.microsoft.com/office/drawing/2010/main" val="0"/>
-              </a:ext>
-            </a:extLst>
-          </a:blip>
-          <a:stretch>
-            <a:fillRect/>
-          </a:stretch>
-        </p:blipFill>
-        <p:spPr>
-          <a:xfrm>
-            <a:off x="2953234" y="1256308"/>
-            <a:ext cx="430568" cy="338713"/>
-          </a:xfrm>
-          <a:prstGeom prst="rect">
-            <a:avLst/>
-          </a:prstGeom>
-        </p:spPr>
-      </p:pic>
-      <p:pic>
-        <p:nvPicPr>
-          <p:cNvPr id="13" name="Picture 12"/>
-          <p:cNvPicPr>
-            <a:picLocks noChangeAspect="1"/>
-          </p:cNvPicPr>
-          <p:nvPr/>
-        </p:nvPicPr>
-        <p:blipFill>
-          <a:blip r:embed="rId6">
-            <a:extLst>
-              <a:ext uri="{28A0092B-C50C-407E-A947-70E740481C1C}">
-                <a14:useLocalDpi xmlns:a14="http://schemas.microsoft.com/office/drawing/2010/main" val="0"/>
-              </a:ext>
-            </a:extLst>
-          </a:blip>
-          <a:stretch>
-            <a:fillRect/>
-          </a:stretch>
-        </p:blipFill>
-        <p:spPr>
-          <a:xfrm>
-            <a:off x="1787897" y="1256309"/>
-            <a:ext cx="471977" cy="338713"/>
-          </a:xfrm>
-          <a:prstGeom prst="rect">
-            <a:avLst/>
-          </a:prstGeom>
-        </p:spPr>
-      </p:pic>
-      <p:pic>
-        <p:nvPicPr>
-          <p:cNvPr id="14" name="Picture 13"/>
-          <p:cNvPicPr>
-            <a:picLocks noChangeAspect="1"/>
-          </p:cNvPicPr>
-          <p:nvPr/>
-        </p:nvPicPr>
-        <p:blipFill>
-          <a:blip r:embed="rId7">
-            <a:extLst>
-              <a:ext uri="{28A0092B-C50C-407E-A947-70E740481C1C}">
-                <a14:useLocalDpi xmlns:a14="http://schemas.microsoft.com/office/drawing/2010/main" val="0"/>
-              </a:ext>
-            </a:extLst>
-          </a:blip>
-          <a:stretch>
-            <a:fillRect/>
-          </a:stretch>
-        </p:blipFill>
-        <p:spPr>
-          <a:xfrm>
-            <a:off x="5288605" y="1204256"/>
-            <a:ext cx="397278" cy="390765"/>
-          </a:xfrm>
-          <a:prstGeom prst="rect">
-            <a:avLst/>
-          </a:prstGeom>
-        </p:spPr>
-      </p:pic>
       <p:sp>
         <p:nvSpPr>
           <p:cNvPr id="15" name="Rectangle 14"/>
@@ -15432,14 +15388,14 @@
       <p:sp>
         <p:nvSpPr>
           <p:cNvPr id="23" name="Rounded Rectangle 22">
-            <a:hlinkClick r:id="rId8" action="ppaction://hlinksldjump"/>
+            <a:hlinkClick r:id="rId4" action="ppaction://hlinksldjump"/>
           </p:cNvPr>
           <p:cNvSpPr/>
           <p:nvPr/>
         </p:nvSpPr>
         <p:spPr>
           <a:xfrm>
-            <a:off x="6187939" y="6202236"/>
+            <a:off x="7758388" y="6165978"/>
             <a:ext cx="1236829" cy="457999"/>
           </a:xfrm>
           <a:prstGeom prst="roundRect">
@@ -15580,6 +15536,149 @@
           </a:p>
         </p:txBody>
       </p:sp>
+      <p:grpSp>
+        <p:nvGrpSpPr>
+          <p:cNvPr id="25" name="Group 24"/>
+          <p:cNvGrpSpPr/>
+          <p:nvPr/>
+        </p:nvGrpSpPr>
+        <p:grpSpPr>
+          <a:xfrm>
+            <a:off x="1787897" y="1204256"/>
+            <a:ext cx="3897986" cy="390766"/>
+            <a:chOff x="1787897" y="1204256"/>
+            <a:chExt cx="3897986" cy="390766"/>
+          </a:xfrm>
+        </p:grpSpPr>
+        <p:pic>
+          <p:nvPicPr>
+            <p:cNvPr id="26" name="Picture 25">
+              <a:hlinkClick r:id="rId5" action="ppaction://hlinksldjump"/>
+            </p:cNvPr>
+            <p:cNvPicPr>
+              <a:picLocks noChangeAspect="1"/>
+            </p:cNvPicPr>
+            <p:nvPr/>
+          </p:nvPicPr>
+          <p:blipFill>
+            <a:blip r:embed="rId6">
+              <a:extLst>
+                <a:ext uri="{28A0092B-C50C-407E-A947-70E740481C1C}">
+                  <a14:useLocalDpi xmlns:a14="http://schemas.microsoft.com/office/drawing/2010/main" val="0"/>
+                </a:ext>
+              </a:extLst>
+            </a:blip>
+            <a:stretch>
+              <a:fillRect/>
+            </a:stretch>
+          </p:blipFill>
+          <p:spPr>
+            <a:xfrm>
+              <a:off x="4067222" y="1256308"/>
+              <a:ext cx="518085" cy="338713"/>
+            </a:xfrm>
+            <a:prstGeom prst="rect">
+              <a:avLst/>
+            </a:prstGeom>
+          </p:spPr>
+        </p:pic>
+        <p:pic>
+          <p:nvPicPr>
+            <p:cNvPr id="27" name="Picture 26">
+              <a:hlinkClick r:id="rId7" action="ppaction://hlinksldjump"/>
+            </p:cNvPr>
+            <p:cNvPicPr>
+              <a:picLocks noChangeAspect="1"/>
+            </p:cNvPicPr>
+            <p:nvPr/>
+          </p:nvPicPr>
+          <p:blipFill>
+            <a:blip r:embed="rId8">
+              <a:extLst>
+                <a:ext uri="{28A0092B-C50C-407E-A947-70E740481C1C}">
+                  <a14:useLocalDpi xmlns:a14="http://schemas.microsoft.com/office/drawing/2010/main" val="0"/>
+                </a:ext>
+              </a:extLst>
+            </a:blip>
+            <a:stretch>
+              <a:fillRect/>
+            </a:stretch>
+          </p:blipFill>
+          <p:spPr>
+            <a:xfrm>
+              <a:off x="2953234" y="1256308"/>
+              <a:ext cx="430568" cy="338713"/>
+            </a:xfrm>
+            <a:prstGeom prst="rect">
+              <a:avLst/>
+            </a:prstGeom>
+          </p:spPr>
+        </p:pic>
+        <p:pic>
+          <p:nvPicPr>
+            <p:cNvPr id="28" name="Picture 27">
+              <a:hlinkClick r:id="rId9" action="ppaction://hlinksldjump"/>
+            </p:cNvPr>
+            <p:cNvPicPr>
+              <a:picLocks noChangeAspect="1"/>
+            </p:cNvPicPr>
+            <p:nvPr/>
+          </p:nvPicPr>
+          <p:blipFill>
+            <a:blip r:embed="rId10">
+              <a:extLst>
+                <a:ext uri="{28A0092B-C50C-407E-A947-70E740481C1C}">
+                  <a14:useLocalDpi xmlns:a14="http://schemas.microsoft.com/office/drawing/2010/main" val="0"/>
+                </a:ext>
+              </a:extLst>
+            </a:blip>
+            <a:stretch>
+              <a:fillRect/>
+            </a:stretch>
+          </p:blipFill>
+          <p:spPr>
+            <a:xfrm>
+              <a:off x="1787897" y="1256309"/>
+              <a:ext cx="471977" cy="338713"/>
+            </a:xfrm>
+            <a:prstGeom prst="rect">
+              <a:avLst/>
+            </a:prstGeom>
+          </p:spPr>
+        </p:pic>
+        <p:pic>
+          <p:nvPicPr>
+            <p:cNvPr id="29" name="Picture 28">
+              <a:hlinkClick r:id="rId11" action="ppaction://hlinksldjump"/>
+            </p:cNvPr>
+            <p:cNvPicPr>
+              <a:picLocks noChangeAspect="1"/>
+            </p:cNvPicPr>
+            <p:nvPr/>
+          </p:nvPicPr>
+          <p:blipFill>
+            <a:blip r:embed="rId12">
+              <a:extLst>
+                <a:ext uri="{28A0092B-C50C-407E-A947-70E740481C1C}">
+                  <a14:useLocalDpi xmlns:a14="http://schemas.microsoft.com/office/drawing/2010/main" val="0"/>
+                </a:ext>
+              </a:extLst>
+            </a:blip>
+            <a:stretch>
+              <a:fillRect/>
+            </a:stretch>
+          </p:blipFill>
+          <p:spPr>
+            <a:xfrm>
+              <a:off x="5288605" y="1204256"/>
+              <a:ext cx="397278" cy="390765"/>
+            </a:xfrm>
+            <a:prstGeom prst="rect">
+              <a:avLst/>
+            </a:prstGeom>
+          </p:spPr>
+        </p:pic>
+      </p:grpSp>
     </p:spTree>
     <p:extLst>
       <p:ext uri="{BB962C8B-B14F-4D97-AF65-F5344CB8AC3E}">
@@ -18686,10 +18785,48 @@
             <a:p>
               <a:pPr algn="ctr"/>
               <a:r>
-                <a:rPr lang="en-US" sz="1200" b="1" dirty="0" smtClean="0"/>
-                <a:t>On ActiveNet, Blue means </a:t>
+                <a:rPr lang="en-US" sz="1200" dirty="0" smtClean="0"/>
+                <a:t>On ActiveNet, </a:t>
               </a:r>
-              <a:endParaRPr lang="en-US" sz="1200" b="1" dirty="0"/>
+              <a:endParaRPr lang="en-US" sz="1200" dirty="0" smtClean="0"/>
+            </a:p>
+            <a:p>
+              <a:pPr algn="ctr"/>
+              <a:r>
+                <a:rPr lang="en-US" sz="1200" dirty="0" smtClean="0"/>
+                <a:t>Blue </a:t>
+              </a:r>
+              <a:r>
+                <a:rPr lang="en-US" sz="1200" dirty="0" smtClean="0"/>
+                <a:t>means </a:t>
+              </a:r>
+              <a:r>
+                <a:rPr lang="en-US" sz="1200" b="1" i="1" dirty="0" smtClean="0"/>
+                <a:t>Live</a:t>
+              </a:r>
+              <a:r>
+                <a:rPr lang="en-US" sz="1200" dirty="0" smtClean="0"/>
+                <a:t> </a:t>
+              </a:r>
+            </a:p>
+            <a:p>
+              <a:pPr algn="ctr"/>
+              <a:r>
+                <a:rPr lang="en-US" sz="1200" dirty="0" smtClean="0"/>
+                <a:t>while </a:t>
+              </a:r>
+            </a:p>
+            <a:p>
+              <a:pPr algn="ctr"/>
+              <a:r>
+                <a:rPr lang="en-US" sz="1200" dirty="0" smtClean="0"/>
+                <a:t>Yellow means </a:t>
+              </a:r>
+              <a:r>
+                <a:rPr lang="en-US" sz="1200" b="1" i="1" dirty="0" smtClean="0"/>
+                <a:t>Trainer</a:t>
+              </a:r>
+              <a:endParaRPr lang="en-US" sz="1200" b="1" i="1" dirty="0"/>
             </a:p>
           </p:txBody>
         </p:sp>
@@ -19848,14 +19985,16 @@
         </p:grpSpPr>
         <p:pic>
           <p:nvPicPr>
-            <p:cNvPr id="4" name="Picture 3"/>
+            <p:cNvPr id="4" name="Picture 3">
+              <a:hlinkClick r:id="rId9" action="ppaction://hlinksldjump"/>
+            </p:cNvPr>
             <p:cNvPicPr>
               <a:picLocks noChangeAspect="1"/>
             </p:cNvPicPr>
             <p:nvPr/>
           </p:nvPicPr>
           <p:blipFill>
-            <a:blip r:embed="rId9">
+            <a:blip r:embed="rId10">
               <a:extLst>
                 <a:ext uri="{28A0092B-C50C-407E-A947-70E740481C1C}">
                   <a14:useLocalDpi xmlns:a14="http://schemas.microsoft.com/office/drawing/2010/main" val="0"/>
@@ -19878,14 +20017,16 @@
         </p:pic>
         <p:pic>
           <p:nvPicPr>
-            <p:cNvPr id="5" name="Picture 4"/>
+            <p:cNvPr id="5" name="Picture 4">
+              <a:hlinkClick r:id="rId11" action="ppaction://hlinksldjump"/>
+            </p:cNvPr>
             <p:cNvPicPr>
               <a:picLocks noChangeAspect="1"/>
             </p:cNvPicPr>
             <p:nvPr/>
           </p:nvPicPr>
           <p:blipFill>
-            <a:blip r:embed="rId10">
+            <a:blip r:embed="rId12">
               <a:extLst>
                 <a:ext uri="{28A0092B-C50C-407E-A947-70E740481C1C}">
                   <a14:useLocalDpi xmlns:a14="http://schemas.microsoft.com/office/drawing/2010/main" val="0"/>
@@ -19908,14 +20049,16 @@
         </p:pic>
         <p:pic>
           <p:nvPicPr>
-            <p:cNvPr id="6" name="Picture 5"/>
+            <p:cNvPr id="6" name="Picture 5">
+              <a:hlinkClick r:id="rId13" action="ppaction://hlinksldjump"/>
+            </p:cNvPr>
             <p:cNvPicPr>
               <a:picLocks noChangeAspect="1"/>
             </p:cNvPicPr>
             <p:nvPr/>
           </p:nvPicPr>
           <p:blipFill>
-            <a:blip r:embed="rId11">
+            <a:blip r:embed="rId14">
               <a:extLst>
                 <a:ext uri="{28A0092B-C50C-407E-A947-70E740481C1C}">
                   <a14:useLocalDpi xmlns:a14="http://schemas.microsoft.com/office/drawing/2010/main" val="0"/>
@@ -19938,14 +20081,16 @@
         </p:pic>
         <p:pic>
           <p:nvPicPr>
-            <p:cNvPr id="7" name="Picture 6"/>
+            <p:cNvPr id="7" name="Picture 6">
+              <a:hlinkClick r:id="rId15" action="ppaction://hlinksldjump"/>
+            </p:cNvPr>
             <p:cNvPicPr>
               <a:picLocks noChangeAspect="1"/>
             </p:cNvPicPr>
             <p:nvPr/>
           </p:nvPicPr>
           <p:blipFill>
-            <a:blip r:embed="rId12">
+            <a:blip r:embed="rId16">
               <a:extLst>
                 <a:ext uri="{28A0092B-C50C-407E-A947-70E740481C1C}">
                   <a14:useLocalDpi xmlns:a14="http://schemas.microsoft.com/office/drawing/2010/main" val="0"/>

</xml_diff>